<commit_message>
add some words to slides
</commit_message>
<xml_diff>
--- a/docs/cg期中展示ppt.pptx
+++ b/docs/cg期中展示ppt.pptx
@@ -623,6 +623,18 @@
           <a:bodyPr/>
           <a:lstStyle/>
           <a:p>
+            <a:r>
+              <a:rPr lang="zh-CN" altLang="en-US" dirty="0" smtClean="0"/>
+              <a:t>由于组员使用不同的平台开发，所以我们首要任务是实现</a:t>
+            </a:r>
+            <a:r>
+              <a:rPr lang="en-US" altLang="zh-CN" dirty="0" err="1" smtClean="0"/>
+              <a:t>cmake</a:t>
+            </a:r>
+            <a:r>
+              <a:rPr lang="zh-CN" altLang="en-US" dirty="0" smtClean="0"/>
+              <a:t>多平台自动构建，同时构建良好的文件目录结构</a:t>
+            </a:r>
             <a:endParaRPr lang="zh-CN" altLang="en-US" dirty="0"/>
           </a:p>
         </p:txBody>
@@ -903,9 +915,22 @@
           <a:lstStyle/>
           <a:p>
             <a:r>
-              <a:rPr kumimoji="1" lang="zh-CN" altLang="en-US" dirty="0"/>
+              <a:rPr kumimoji="1" lang="zh-CN" altLang="en-US" dirty="0" smtClean="0"/>
               <a:t>这是软件的界面</a:t>
             </a:r>
+            <a:r>
+              <a:rPr kumimoji="1" lang="en-US" altLang="zh-CN" dirty="0" smtClean="0"/>
+              <a:t>,</a:t>
+            </a:r>
+            <a:r>
+              <a:rPr kumimoji="1" lang="en-US" altLang="zh-CN" baseline="0" dirty="0" smtClean="0"/>
+              <a:t> </a:t>
+            </a:r>
+            <a:r>
+              <a:rPr kumimoji="1" lang="zh-CN" altLang="en-US" baseline="0" dirty="0" smtClean="0"/>
+              <a:t>用户可以通过增加、删除方块，改变方块颜色，对称复制等操作创建它们的模型</a:t>
+            </a:r>
+            <a:endParaRPr kumimoji="1" lang="zh-CN" altLang="en-US" dirty="0"/>
           </a:p>
         </p:txBody>
       </p:sp>
@@ -1007,6 +1032,18 @@
               <a:defRPr/>
             </a:pPr>
             <a:r>
+              <a:rPr lang="zh-CN" altLang="en-US" sz="1200" b="0" i="0" u="none" strike="noStrike" kern="1200" dirty="0" smtClean="0">
+                <a:solidFill>
+                  <a:schemeClr val="tx1"/>
+                </a:solidFill>
+                <a:effectLst/>
+                <a:latin typeface="+mn-lt"/>
+                <a:ea typeface="+mn-ea"/>
+                <a:cs typeface="+mn-cs"/>
+              </a:rPr>
+              <a:t>那么先让</a:t>
+            </a:r>
+            <a:r>
               <a:rPr lang="zh-CN" altLang="en-US" sz="1200" b="0" i="0" u="none" strike="noStrike" kern="1200" dirty="0">
                 <a:solidFill>
                   <a:schemeClr val="tx1"/>
@@ -1016,7 +1053,7 @@
                 <a:ea typeface="+mn-ea"/>
                 <a:cs typeface="+mn-cs"/>
               </a:rPr>
-              <a:t>然后让我们通过视频来看看这个东西能做出点什么</a:t>
+              <a:t>我们通过视频来看看这个东西能做出点什么</a:t>
             </a:r>
             <a:endParaRPr lang="en-US" altLang="zh-CN" sz="1200" b="0" i="0" u="none" strike="noStrike" kern="1200" dirty="0">
               <a:solidFill>
@@ -1191,9 +1228,18 @@
           <a:lstStyle/>
           <a:p>
             <a:r>
+              <a:rPr kumimoji="1" lang="zh-CN" altLang="en-US" dirty="0" smtClean="0"/>
+              <a:t>可以看到，只要</a:t>
+            </a:r>
+            <a:r>
               <a:rPr kumimoji="1" lang="zh-CN" altLang="en-US" dirty="0"/>
-              <a:t>只要你富有想象力，你就可以构建以下的模型</a:t>
-            </a:r>
+              <a:t>你富有想象力，你就可以</a:t>
+            </a:r>
+            <a:r>
+              <a:rPr kumimoji="1" lang="zh-CN" altLang="en-US" dirty="0" smtClean="0"/>
+              <a:t>构建的模你想要的模型</a:t>
+            </a:r>
+            <a:endParaRPr kumimoji="1" lang="zh-CN" altLang="en-US" dirty="0"/>
           </a:p>
         </p:txBody>
       </p:sp>
@@ -4686,6 +4732,13 @@
   <p:clrMapOvr>
     <a:masterClrMapping/>
   </p:clrMapOvr>
+  <p:timing>
+    <p:tnLst>
+      <p:par>
+        <p:cTn id="1" dur="indefinite" restart="never" nodeType="tmRoot"/>
+      </p:par>
+    </p:tnLst>
+  </p:timing>
 </p:sld>
 </file>
 
@@ -4818,6 +4871,13 @@
   <p:transition spd="slow">
     <p:push dir="u"/>
   </p:transition>
+  <p:timing>
+    <p:tnLst>
+      <p:par>
+        <p:cTn id="1" dur="indefinite" restart="never" nodeType="tmRoot"/>
+      </p:par>
+    </p:tnLst>
+  </p:timing>
 </p:sld>
 </file>
 
@@ -4851,7 +4911,7 @@
           <p:cNvPr id="5" name="图片 4">
             <a:extLst>
               <a:ext uri="{FF2B5EF4-FFF2-40B4-BE49-F238E27FC236}">
-                <a16:creationId xmlns:a16="http://schemas.microsoft.com/office/drawing/2014/main" id="{1FF11887-E47A-43E7-A235-3DE35CA340D6}"/>
+                <a16:creationId xmlns:a16="http://schemas.microsoft.com/office/drawing/2014/main" xmlns="" id="{1FF11887-E47A-43E7-A235-3DE35CA340D6}"/>
               </a:ext>
             </a:extLst>
           </p:cNvPr>
@@ -4881,7 +4941,7 @@
           <p:cNvPr id="6" name="图片 5">
             <a:extLst>
               <a:ext uri="{FF2B5EF4-FFF2-40B4-BE49-F238E27FC236}">
-                <a16:creationId xmlns:a16="http://schemas.microsoft.com/office/drawing/2014/main" id="{5822A4C8-38DA-4EFF-B186-84E3DF2CCEE2}"/>
+                <a16:creationId xmlns:a16="http://schemas.microsoft.com/office/drawing/2014/main" xmlns="" id="{5822A4C8-38DA-4EFF-B186-84E3DF2CCEE2}"/>
               </a:ext>
             </a:extLst>
           </p:cNvPr>
@@ -4916,6 +4976,13 @@
   <p:clrMapOvr>
     <a:masterClrMapping/>
   </p:clrMapOvr>
+  <p:timing>
+    <p:tnLst>
+      <p:par>
+        <p:cTn id="1" dur="indefinite" restart="never" nodeType="tmRoot"/>
+      </p:par>
+    </p:tnLst>
+  </p:timing>
 </p:sld>
 </file>
 
@@ -5048,6 +5115,13 @@
   <p:transition spd="slow">
     <p:push dir="u"/>
   </p:transition>
+  <p:timing>
+    <p:tnLst>
+      <p:par>
+        <p:cTn id="1" dur="indefinite" restart="never" nodeType="tmRoot"/>
+      </p:par>
+    </p:tnLst>
+  </p:timing>
 </p:sld>
 </file>
 
@@ -5194,6 +5268,13 @@
   <p:transition spd="slow">
     <p:push dir="u"/>
   </p:transition>
+  <p:timing>
+    <p:tnLst>
+      <p:par>
+        <p:cTn id="1" dur="indefinite" restart="never" nodeType="tmRoot"/>
+      </p:par>
+    </p:tnLst>
+  </p:timing>
 </p:sld>
 </file>
 
@@ -5250,6 +5331,13 @@
       </p:transition>
     </mc:Fallback>
   </mc:AlternateContent>
+  <p:timing>
+    <p:tnLst>
+      <p:par>
+        <p:cTn id="1" dur="indefinite" restart="never" nodeType="tmRoot"/>
+      </p:par>
+    </p:tnLst>
+  </p:timing>
 </p:sld>
 </file>
 
@@ -5336,6 +5424,13 @@
       </p:transition>
     </mc:Fallback>
   </mc:AlternateContent>
+  <p:timing>
+    <p:tnLst>
+      <p:par>
+        <p:cTn id="1" dur="indefinite" restart="never" nodeType="tmRoot"/>
+      </p:par>
+    </p:tnLst>
+  </p:timing>
 </p:sld>
 </file>
 
@@ -5392,6 +5487,13 @@
       </p:transition>
     </mc:Fallback>
   </mc:AlternateContent>
+  <p:timing>
+    <p:tnLst>
+      <p:par>
+        <p:cTn id="1" dur="indefinite" restart="never" nodeType="tmRoot"/>
+      </p:par>
+    </p:tnLst>
+  </p:timing>
 </p:sld>
 </file>
 
@@ -5448,6 +5550,13 @@
       </p:transition>
     </mc:Fallback>
   </mc:AlternateContent>
+  <p:timing>
+    <p:tnLst>
+      <p:par>
+        <p:cTn id="1" dur="indefinite" restart="never" nodeType="tmRoot"/>
+      </p:par>
+    </p:tnLst>
+  </p:timing>
 </p:sld>
 </file>
 
@@ -5504,6 +5613,13 @@
       </p:transition>
     </mc:Fallback>
   </mc:AlternateContent>
+  <p:timing>
+    <p:tnLst>
+      <p:par>
+        <p:cTn id="1" dur="indefinite" restart="never" nodeType="tmRoot"/>
+      </p:par>
+    </p:tnLst>
+  </p:timing>
 </p:sld>
 </file>
 
@@ -5656,6 +5772,13 @@
       </p:transition>
     </mc:Fallback>
   </mc:AlternateContent>
+  <p:timing>
+    <p:tnLst>
+      <p:par>
+        <p:cTn id="1" dur="indefinite" restart="never" nodeType="tmRoot"/>
+      </p:par>
+    </p:tnLst>
+  </p:timing>
 </p:sld>
 </file>
 

</xml_diff>